<commit_message>
Adicionar descrição no slide de Introdução.
</commit_message>
<xml_diff>
--- a/apresentacao ga bd 2.pptx
+++ b/apresentacao ga bd 2.pptx
@@ -149,7 +149,7 @@
       </p14:sectionLst>
     </p:ext>
     <p:ext uri="{EFAFB233-063F-42B5-8137-9DF3F51BA10A}">
-      <p15:sldGuideLst xmlns:p15="http://schemas.microsoft.com/office/powerpoint/2012/main">
+      <p15:sldGuideLst xmlns:p15="http://schemas.microsoft.com/office/powerpoint/2012/main" xmlns="">
         <p15:guide id="1" orient="horz" pos="2160">
           <p15:clr>
             <a:srgbClr val="A4A3A4"/>
@@ -163,7 +163,7 @@
       </p15:sldGuideLst>
     </p:ext>
     <p:ext uri="{2D200454-40CA-4A62-9FC3-DE9A4176ACB9}">
-      <p15:notesGuideLst xmlns:p15="http://schemas.microsoft.com/office/powerpoint/2012/main">
+      <p15:notesGuideLst xmlns:p15="http://schemas.microsoft.com/office/powerpoint/2012/main" xmlns="">
         <p15:guide id="1" orient="horz" pos="2880">
           <p15:clr>
             <a:srgbClr val="A4A3A4"/>
@@ -283,7 +283,7 @@
             <a:fld id="{D83FDC75-7F73-4A4A-A77C-09AADF00E0EA}" type="datetimeFigureOut">
               <a:rPr lang="pt-BR" smtClean="0"/>
               <a:pPr/>
-              <a:t>02/04/2017</a:t>
+              <a:t>03/04/17</a:t>
             </a:fld>
             <a:endParaRPr lang="pt-BR" dirty="0"/>
           </a:p>
@@ -350,13 +350,18 @@
             <a:fld id="{459226BF-1F13-42D3-80DC-373E7ADD1EBC}" type="slidenum">
               <a:rPr lang="pt-BR" smtClean="0"/>
               <a:pPr/>
-              <a:t>‹nº›</a:t>
+              <a:t>‹#›</a:t>
             </a:fld>
             <a:endParaRPr lang="pt-BR" dirty="0"/>
           </a:p>
         </p:txBody>
       </p:sp>
     </p:spTree>
+    <p:extLst>
+      <p:ext uri="{BB962C8B-B14F-4D97-AF65-F5344CB8AC3E}">
+        <p14:creationId xmlns:p14="http://schemas.microsoft.com/office/powerpoint/2010/main" val="4245792559"/>
+      </p:ext>
+    </p:extLst>
   </p:cSld>
   <p:clrMap bg1="lt1" tx1="dk1" bg2="lt2" tx2="dk2" accent1="accent1" accent2="accent2" accent3="accent3" accent4="accent4" accent5="accent5" accent6="accent6" hlink="hlink" folHlink="folHlink"/>
 </p:handoutMaster>
@@ -444,7 +449,7 @@
           <a:p>
             <a:fld id="{48AEF76B-3757-4A0B-AF93-28494465C1DD}" type="datetimeFigureOut">
               <a:pPr/>
-              <a:t>02/04/2017</a:t>
+              <a:t>03/04/17</a:t>
             </a:fld>
             <a:endParaRPr lang="pt-BR"/>
           </a:p>
@@ -602,13 +607,18 @@
           <a:p>
             <a:fld id="{75693FD4-8F83-4EF7-AC3F-0DC0388986B0}" type="slidenum">
               <a:pPr/>
-              <a:t>‹nº›</a:t>
+              <a:t>‹#›</a:t>
             </a:fld>
             <a:endParaRPr lang="pt-BR"/>
           </a:p>
         </p:txBody>
       </p:sp>
     </p:spTree>
+    <p:extLst>
+      <p:ext uri="{BB962C8B-B14F-4D97-AF65-F5344CB8AC3E}">
+        <p14:creationId xmlns:p14="http://schemas.microsoft.com/office/powerpoint/2010/main" val="3488953189"/>
+      </p:ext>
+    </p:extLst>
   </p:cSld>
   <p:clrMap bg1="lt1" tx1="dk1" bg2="lt2" tx2="dk2" accent1="accent1" accent2="accent2" accent3="accent3" accent4="accent4" accent5="accent5" accent6="accent6" hlink="hlink" folHlink="folHlink"/>
   <p:notesStyle>
@@ -2524,13 +2534,13 @@
   <p:clrMapOvr>
     <a:masterClrMapping/>
   </p:clrMapOvr>
-  <p:transition spd="slow">
+  <p:transition xmlns:p14="http://schemas.microsoft.com/office/powerpoint/2010/main" spd="slow">
     <p:wipe dir="d"/>
   </p:transition>
   <p:timing>
     <p:tnLst>
       <p:par>
-        <p:cTn id="1" dur="indefinite" restart="never" nodeType="tmRoot">
+        <p:cTn xmlns:p14="http://schemas.microsoft.com/office/powerpoint/2010/main" id="1" dur="indefinite" restart="never" nodeType="tmRoot">
           <p:childTnLst>
             <p:seq concurrent="1" nextAc="seek">
               <p:cTn id="2" dur="indefinite" nodeType="mainSeq">
@@ -2721,7 +2731,7 @@
           <a:p>
             <a:fld id="{757B281C-5159-4971-8228-52B9A72E9ED2}" type="datetimeFigureOut">
               <a:pPr/>
-              <a:t>02/04/2017</a:t>
+              <a:t>03/04/17</a:t>
             </a:fld>
             <a:endParaRPr kumimoji="0" lang="pt-BR"/>
           </a:p>
@@ -2763,7 +2773,7 @@
           <a:p>
             <a:fld id="{33D6E5A2-EC83-451F-A719-9AC1370DD5CF}" type="slidenum">
               <a:pPr/>
-              <a:t>‹nº›</a:t>
+              <a:t>‹#›</a:t>
             </a:fld>
             <a:endParaRPr kumimoji="0" lang="pt-BR"/>
           </a:p>
@@ -2774,13 +2784,13 @@
   <p:clrMapOvr>
     <a:masterClrMapping/>
   </p:clrMapOvr>
-  <p:transition spd="slow">
+  <p:transition xmlns:p14="http://schemas.microsoft.com/office/powerpoint/2010/main" spd="slow">
     <p:wipe dir="d"/>
   </p:transition>
   <p:timing>
     <p:tnLst>
       <p:par>
-        <p:cTn id="1" dur="indefinite" restart="never" nodeType="tmRoot"/>
+        <p:cTn xmlns:p14="http://schemas.microsoft.com/office/powerpoint/2010/main" id="1" dur="indefinite" restart="never" nodeType="tmRoot"/>
       </p:par>
     </p:tnLst>
   </p:timing>
@@ -2821,7 +2831,7 @@
           <a:p>
             <a:fld id="{757B281C-5159-4971-8228-52B9A72E9ED2}" type="datetimeFigureOut">
               <a:pPr/>
-              <a:t>02/04/2017</a:t>
+              <a:t>03/04/17</a:t>
             </a:fld>
             <a:endParaRPr kumimoji="0" lang="pt-BR"/>
           </a:p>
@@ -2863,7 +2873,7 @@
           <a:p>
             <a:fld id="{33D6E5A2-EC83-451F-A719-9AC1370DD5CF}" type="slidenum">
               <a:pPr/>
-              <a:t>‹nº›</a:t>
+              <a:t>‹#›</a:t>
             </a:fld>
             <a:endParaRPr kumimoji="0" lang="pt-BR"/>
           </a:p>
@@ -2874,13 +2884,13 @@
   <p:clrMapOvr>
     <a:masterClrMapping/>
   </p:clrMapOvr>
-  <p:transition spd="slow">
+  <p:transition xmlns:p14="http://schemas.microsoft.com/office/powerpoint/2010/main" spd="slow">
     <p:wipe dir="d"/>
   </p:transition>
   <p:timing>
     <p:tnLst>
       <p:par>
-        <p:cTn id="1" dur="indefinite" restart="never" nodeType="tmRoot"/>
+        <p:cTn xmlns:p14="http://schemas.microsoft.com/office/powerpoint/2010/main" id="1" dur="indefinite" restart="never" nodeType="tmRoot"/>
       </p:par>
     </p:tnLst>
   </p:timing>
@@ -2955,7 +2965,7 @@
           <a:p>
             <a:fld id="{757B281C-5159-4971-8228-52B9A72E9ED2}" type="datetimeFigureOut">
               <a:pPr/>
-              <a:t>02/04/2017</a:t>
+              <a:t>03/04/17</a:t>
             </a:fld>
             <a:endParaRPr kumimoji="0" lang="pt-BR"/>
           </a:p>
@@ -3007,7 +3017,7 @@
           <a:p>
             <a:fld id="{33D6E5A2-EC83-451F-A719-9AC1370DD5CF}" type="slidenum">
               <a:pPr/>
-              <a:t>‹nº›</a:t>
+              <a:t>‹#›</a:t>
             </a:fld>
             <a:endParaRPr kumimoji="0" lang="pt-BR"/>
           </a:p>
@@ -3018,13 +3028,13 @@
   <p:clrMapOvr>
     <a:masterClrMapping/>
   </p:clrMapOvr>
-  <p:transition spd="slow">
+  <p:transition xmlns:p14="http://schemas.microsoft.com/office/powerpoint/2010/main" spd="slow">
     <p:wipe dir="d"/>
   </p:transition>
   <p:timing>
     <p:tnLst>
       <p:par>
-        <p:cTn id="1" dur="indefinite" restart="never" nodeType="tmRoot"/>
+        <p:cTn xmlns:p14="http://schemas.microsoft.com/office/powerpoint/2010/main" id="1" dur="indefinite" restart="never" nodeType="tmRoot"/>
       </p:par>
     </p:tnLst>
   </p:timing>
@@ -3158,7 +3168,7 @@
           <a:p>
             <a:fld id="{757B281C-5159-4971-8228-52B9A72E9ED2}" type="datetimeFigureOut">
               <a:pPr/>
-              <a:t>02/04/2017</a:t>
+              <a:t>03/04/17</a:t>
             </a:fld>
             <a:endParaRPr kumimoji="0" lang="pt-BR"/>
           </a:p>
@@ -3200,7 +3210,7 @@
           <a:p>
             <a:fld id="{33D6E5A2-EC83-451F-A719-9AC1370DD5CF}" type="slidenum">
               <a:pPr/>
-              <a:t>‹nº›</a:t>
+              <a:t>‹#›</a:t>
             </a:fld>
             <a:endParaRPr kumimoji="0" lang="pt-BR"/>
           </a:p>
@@ -3245,13 +3255,13 @@
   <p:clrMapOvr>
     <a:masterClrMapping/>
   </p:clrMapOvr>
-  <p:transition spd="slow">
+  <p:transition xmlns:p14="http://schemas.microsoft.com/office/powerpoint/2010/main" spd="slow">
     <p:wipe dir="d"/>
   </p:transition>
   <p:timing>
     <p:tnLst>
       <p:par>
-        <p:cTn id="1" dur="indefinite" restart="never" nodeType="tmRoot">
+        <p:cTn xmlns:p14="http://schemas.microsoft.com/office/powerpoint/2010/main" id="1" dur="indefinite" restart="never" nodeType="tmRoot">
           <p:childTnLst>
             <p:seq concurrent="1" nextAc="seek">
               <p:cTn id="2" dur="indefinite" nodeType="mainSeq">
@@ -3553,7 +3563,7 @@
           <a:p>
             <a:fld id="{757B281C-5159-4971-8228-52B9A72E9ED2}" type="datetimeFigureOut">
               <a:pPr/>
-              <a:t>02/04/2017</a:t>
+              <a:t>03/04/17</a:t>
             </a:fld>
             <a:endParaRPr kumimoji="0" lang="pt-BR"/>
           </a:p>
@@ -3600,7 +3610,7 @@
           <a:p>
             <a:fld id="{33D6E5A2-EC83-451F-A719-9AC1370DD5CF}" type="slidenum">
               <a:pPr/>
-              <a:t>‹nº›</a:t>
+              <a:t>‹#›</a:t>
             </a:fld>
             <a:endParaRPr kumimoji="0" lang="pt-BR"/>
           </a:p>
@@ -3611,13 +3621,13 @@
   <p:clrMapOvr>
     <a:masterClrMapping/>
   </p:clrMapOvr>
-  <p:transition spd="slow">
+  <p:transition xmlns:p14="http://schemas.microsoft.com/office/powerpoint/2010/main" spd="slow">
     <p:wipe dir="d"/>
   </p:transition>
   <p:timing>
     <p:tnLst>
       <p:par>
-        <p:cTn id="1" dur="indefinite" restart="never" nodeType="tmRoot"/>
+        <p:cTn xmlns:p14="http://schemas.microsoft.com/office/powerpoint/2010/main" id="1" dur="indefinite" restart="never" nodeType="tmRoot"/>
       </p:par>
     </p:tnLst>
   </p:timing>
@@ -3852,7 +3862,7 @@
           <a:p>
             <a:fld id="{757B281C-5159-4971-8228-52B9A72E9ED2}" type="datetimeFigureOut">
               <a:pPr/>
-              <a:t>02/04/2017</a:t>
+              <a:t>03/04/17</a:t>
             </a:fld>
             <a:endParaRPr kumimoji="0" lang="pt-BR"/>
           </a:p>
@@ -3894,7 +3904,7 @@
           <a:p>
             <a:fld id="{33D6E5A2-EC83-451F-A719-9AC1370DD5CF}" type="slidenum">
               <a:pPr/>
-              <a:t>‹nº›</a:t>
+              <a:t>‹#›</a:t>
             </a:fld>
             <a:endParaRPr kumimoji="0" lang="pt-BR"/>
           </a:p>
@@ -3905,13 +3915,13 @@
   <p:clrMapOvr>
     <a:masterClrMapping/>
   </p:clrMapOvr>
-  <p:transition spd="slow">
+  <p:transition xmlns:p14="http://schemas.microsoft.com/office/powerpoint/2010/main" spd="slow">
     <p:wipe dir="d"/>
   </p:transition>
   <p:timing>
     <p:tnLst>
       <p:par>
-        <p:cTn id="1" dur="indefinite" restart="never" nodeType="tmRoot"/>
+        <p:cTn xmlns:p14="http://schemas.microsoft.com/office/powerpoint/2010/main" id="1" dur="indefinite" restart="never" nodeType="tmRoot"/>
       </p:par>
     </p:tnLst>
   </p:timing>
@@ -4280,7 +4290,7 @@
           <a:p>
             <a:fld id="{757B281C-5159-4971-8228-52B9A72E9ED2}" type="datetimeFigureOut">
               <a:pPr/>
-              <a:t>02/04/2017</a:t>
+              <a:t>03/04/17</a:t>
             </a:fld>
             <a:endParaRPr kumimoji="0" lang="pt-BR"/>
           </a:p>
@@ -4322,7 +4332,7 @@
           <a:p>
             <a:fld id="{33D6E5A2-EC83-451F-A719-9AC1370DD5CF}" type="slidenum">
               <a:pPr/>
-              <a:t>‹nº›</a:t>
+              <a:t>‹#›</a:t>
             </a:fld>
             <a:endParaRPr kumimoji="0" lang="pt-BR"/>
           </a:p>
@@ -4333,7 +4343,7 @@
   <p:clrMapOvr>
     <a:masterClrMapping/>
   </p:clrMapOvr>
-  <p:transition spd="slow">
+  <p:transition xmlns:p14="http://schemas.microsoft.com/office/powerpoint/2010/main" spd="slow">
     <p:wipe dir="d"/>
   </p:transition>
 </p:sldLayout>
@@ -4556,7 +4566,7 @@
           <a:p>
             <a:fld id="{757B281C-5159-4971-8228-52B9A72E9ED2}" type="datetimeFigureOut">
               <a:pPr/>
-              <a:t>02/04/2017</a:t>
+              <a:t>03/04/17</a:t>
             </a:fld>
             <a:endParaRPr kumimoji="0" lang="pt-BR"/>
           </a:p>
@@ -4598,7 +4608,7 @@
           <a:p>
             <a:fld id="{33D6E5A2-EC83-451F-A719-9AC1370DD5CF}" type="slidenum">
               <a:pPr/>
-              <a:t>‹nº›</a:t>
+              <a:t>‹#›</a:t>
             </a:fld>
             <a:endParaRPr kumimoji="0" lang="pt-BR"/>
           </a:p>
@@ -4609,13 +4619,13 @@
   <p:clrMapOvr>
     <a:masterClrMapping/>
   </p:clrMapOvr>
-  <p:transition spd="slow">
+  <p:transition xmlns:p14="http://schemas.microsoft.com/office/powerpoint/2010/main" spd="slow">
     <p:wipe dir="d"/>
   </p:transition>
   <p:timing>
     <p:tnLst>
       <p:par>
-        <p:cTn id="1" dur="indefinite" restart="never" nodeType="tmRoot"/>
+        <p:cTn xmlns:p14="http://schemas.microsoft.com/office/powerpoint/2010/main" id="1" dur="indefinite" restart="never" nodeType="tmRoot"/>
       </p:par>
     </p:tnLst>
   </p:timing>
@@ -4820,7 +4830,7 @@
           <a:p>
             <a:fld id="{757B281C-5159-4971-8228-52B9A72E9ED2}" type="datetimeFigureOut">
               <a:pPr/>
-              <a:t>02/04/2017</a:t>
+              <a:t>03/04/17</a:t>
             </a:fld>
             <a:endParaRPr kumimoji="0" lang="pt-BR"/>
           </a:p>
@@ -4862,7 +4872,7 @@
           <a:p>
             <a:fld id="{33D6E5A2-EC83-451F-A719-9AC1370DD5CF}" type="slidenum">
               <a:pPr/>
-              <a:t>‹nº›</a:t>
+              <a:t>‹#›</a:t>
             </a:fld>
             <a:endParaRPr kumimoji="0" lang="pt-BR"/>
           </a:p>
@@ -4873,7 +4883,7 @@
   <p:clrMapOvr>
     <a:masterClrMapping/>
   </p:clrMapOvr>
-  <p:transition spd="slow">
+  <p:transition xmlns:p14="http://schemas.microsoft.com/office/powerpoint/2010/main" spd="slow">
     <p:wipe dir="d"/>
   </p:transition>
 </p:sldLayout>
@@ -4989,7 +4999,7 @@
           <a:p>
             <a:fld id="{757B281C-5159-4971-8228-52B9A72E9ED2}" type="datetimeFigureOut">
               <a:pPr/>
-              <a:t>02/04/2017</a:t>
+              <a:t>03/04/17</a:t>
             </a:fld>
             <a:endParaRPr kumimoji="0" lang="pt-BR"/>
           </a:p>
@@ -5031,7 +5041,7 @@
           <a:p>
             <a:fld id="{33D6E5A2-EC83-451F-A719-9AC1370DD5CF}" type="slidenum">
               <a:pPr/>
-              <a:t>‹nº›</a:t>
+              <a:t>‹#›</a:t>
             </a:fld>
             <a:endParaRPr kumimoji="0" lang="pt-BR"/>
           </a:p>
@@ -5042,7 +5052,7 @@
   <p:clrMapOvr>
     <a:masterClrMapping/>
   </p:clrMapOvr>
-  <p:transition spd="slow">
+  <p:transition xmlns:p14="http://schemas.microsoft.com/office/powerpoint/2010/main" spd="slow">
     <p:wipe dir="d"/>
   </p:transition>
 </p:sldLayout>
@@ -5168,7 +5178,7 @@
           <a:p>
             <a:fld id="{757B281C-5159-4971-8228-52B9A72E9ED2}" type="datetimeFigureOut">
               <a:pPr/>
-              <a:t>02/04/2017</a:t>
+              <a:t>03/04/17</a:t>
             </a:fld>
             <a:endParaRPr kumimoji="0" lang="pt-BR"/>
           </a:p>
@@ -5210,7 +5220,7 @@
           <a:p>
             <a:fld id="{33D6E5A2-EC83-451F-A719-9AC1370DD5CF}" type="slidenum">
               <a:pPr/>
-              <a:t>‹nº›</a:t>
+              <a:t>‹#›</a:t>
             </a:fld>
             <a:endParaRPr kumimoji="0" lang="pt-BR"/>
           </a:p>
@@ -5221,7 +5231,7 @@
   <p:clrMapOvr>
     <a:masterClrMapping/>
   </p:clrMapOvr>
-  <p:transition spd="slow">
+  <p:transition xmlns:p14="http://schemas.microsoft.com/office/powerpoint/2010/main" spd="slow">
     <p:wipe dir="d"/>
   </p:transition>
 </p:sldLayout>
@@ -5409,7 +5419,7 @@
           <a:p>
             <a:fld id="{757B281C-5159-4971-8228-52B9A72E9ED2}" type="datetimeFigureOut">
               <a:pPr/>
-              <a:t>02/04/2017</a:t>
+              <a:t>03/04/17</a:t>
             </a:fld>
             <a:endParaRPr kumimoji="0" lang="pt-BR"/>
           </a:p>
@@ -5487,7 +5497,7 @@
           <a:p>
             <a:fld id="{33D6E5A2-EC83-451F-A719-9AC1370DD5CF}" type="slidenum">
               <a:pPr/>
-              <a:t>‹nº›</a:t>
+              <a:t>‹#›</a:t>
             </a:fld>
             <a:endParaRPr kumimoji="0" lang="pt-BR"/>
           </a:p>
@@ -5539,13 +5549,13 @@
     <p:sldLayoutId id="2147483655" r:id="rId11"/>
     <p:sldLayoutId id="2147483663" r:id="rId12"/>
   </p:sldLayoutIdLst>
-  <p:transition spd="slow">
+  <p:transition xmlns:p14="http://schemas.microsoft.com/office/powerpoint/2010/main" spd="slow">
     <p:wipe dir="d"/>
   </p:transition>
   <p:timing>
     <p:tnLst>
       <p:par>
-        <p:cTn id="1" dur="indefinite" restart="never" nodeType="tmRoot"/>
+        <p:cTn xmlns:p14="http://schemas.microsoft.com/office/powerpoint/2010/main" id="1" dur="indefinite" restart="never" nodeType="tmRoot"/>
       </p:par>
     </p:tnLst>
   </p:timing>
@@ -5916,13 +5926,13 @@
   <p:clrMapOvr>
     <a:masterClrMapping/>
   </p:clrMapOvr>
-  <p:transition spd="slow">
+  <p:transition xmlns:p14="http://schemas.microsoft.com/office/powerpoint/2010/main" spd="slow">
     <p:fade/>
   </p:transition>
   <p:timing>
     <p:tnLst>
       <p:par>
-        <p:cTn id="1" dur="indefinite" restart="never" nodeType="tmRoot"/>
+        <p:cTn xmlns:p14="http://schemas.microsoft.com/office/powerpoint/2010/main" id="1" dur="indefinite" restart="never" nodeType="tmRoot"/>
       </p:par>
     </p:tnLst>
   </p:timing>
@@ -6050,13 +6060,13 @@
   <p:clrMapOvr>
     <a:masterClrMapping/>
   </p:clrMapOvr>
-  <p:transition spd="slow">
+  <p:transition xmlns:p14="http://schemas.microsoft.com/office/powerpoint/2010/main" spd="slow">
     <p:wipe dir="d"/>
   </p:transition>
   <p:timing>
     <p:tnLst>
       <p:par>
-        <p:cTn id="1" dur="indefinite" restart="never" nodeType="tmRoot"/>
+        <p:cTn xmlns:p14="http://schemas.microsoft.com/office/powerpoint/2010/main" id="1" dur="indefinite" restart="never" nodeType="tmRoot"/>
       </p:par>
     </p:tnLst>
   </p:timing>
@@ -6118,13 +6128,13 @@
   <p:clrMapOvr>
     <a:masterClrMapping/>
   </p:clrMapOvr>
-  <p:transition>
+  <p:transition xmlns:p14="http://schemas.microsoft.com/office/powerpoint/2010/main">
     <p:fade/>
   </p:transition>
   <p:timing>
     <p:tnLst>
       <p:par>
-        <p:cTn id="1" dur="indefinite" restart="never" nodeType="tmRoot"/>
+        <p:cTn xmlns:p14="http://schemas.microsoft.com/office/powerpoint/2010/main" id="1" dur="indefinite" restart="never" nodeType="tmRoot"/>
       </p:par>
     </p:tnLst>
   </p:timing>
@@ -6294,13 +6304,13 @@
   <p:clrMapOvr>
     <a:masterClrMapping/>
   </p:clrMapOvr>
-  <p:transition spd="slow">
+  <p:transition xmlns:p14="http://schemas.microsoft.com/office/powerpoint/2010/main" spd="slow">
     <p:wipe dir="d"/>
   </p:transition>
   <p:timing>
     <p:tnLst>
       <p:par>
-        <p:cTn id="1" dur="indefinite" restart="never" nodeType="tmRoot"/>
+        <p:cTn xmlns:p14="http://schemas.microsoft.com/office/powerpoint/2010/main" id="1" dur="indefinite" restart="never" nodeType="tmRoot"/>
       </p:par>
     </p:tnLst>
   </p:timing>
@@ -6417,6 +6427,20 @@
               <a:rPr lang="pt-BR" sz="2000" dirty="0" err="1" smtClean="0"/>
               <a:t>MySql</a:t>
             </a:r>
+            <a:endParaRPr lang="pt-BR" sz="2000" dirty="0" smtClean="0"/>
+          </a:p>
+          <a:p>
+            <a:endParaRPr lang="pt-BR" sz="2000" dirty="0" smtClean="0"/>
+          </a:p>
+          <a:p>
+            <a:r>
+              <a:rPr lang="pt-BR" sz="2000" dirty="0" smtClean="0"/>
+              <a:t>Tema: Modelagem para um sistema de gerenciamento de estoque farmac</a:t>
+            </a:r>
+            <a:r>
+              <a:rPr lang="pt-BR" sz="2000" dirty="0" smtClean="0"/>
+              <a:t>êutico.</a:t>
+            </a:r>
             <a:endParaRPr lang="pt-BR" sz="2000" dirty="0"/>
           </a:p>
         </p:txBody>
@@ -6434,13 +6458,13 @@
   <p:clrMapOvr>
     <a:masterClrMapping/>
   </p:clrMapOvr>
-  <p:transition spd="slow">
+  <p:transition xmlns:p14="http://schemas.microsoft.com/office/powerpoint/2010/main" spd="slow">
     <p:wipe dir="d"/>
   </p:transition>
   <p:timing>
     <p:tnLst>
       <p:par>
-        <p:cTn id="1" dur="indefinite" restart="never" nodeType="tmRoot"/>
+        <p:cTn xmlns:p14="http://schemas.microsoft.com/office/powerpoint/2010/main" id="1" dur="indefinite" restart="never" nodeType="tmRoot"/>
       </p:par>
     </p:tnLst>
   </p:timing>
@@ -6529,13 +6553,13 @@
   <p:clrMapOvr>
     <a:masterClrMapping/>
   </p:clrMapOvr>
-  <p:transition spd="slow">
+  <p:transition xmlns:p14="http://schemas.microsoft.com/office/powerpoint/2010/main" spd="slow">
     <p:wipe dir="d"/>
   </p:transition>
   <p:timing>
     <p:tnLst>
       <p:par>
-        <p:cTn id="1" dur="indefinite" restart="never" nodeType="tmRoot"/>
+        <p:cTn xmlns:p14="http://schemas.microsoft.com/office/powerpoint/2010/main" id="1" dur="indefinite" restart="never" nodeType="tmRoot"/>
       </p:par>
     </p:tnLst>
   </p:timing>
@@ -6624,13 +6648,13 @@
   <p:clrMapOvr>
     <a:masterClrMapping/>
   </p:clrMapOvr>
-  <p:transition spd="slow">
+  <p:transition xmlns:p14="http://schemas.microsoft.com/office/powerpoint/2010/main" spd="slow">
     <p:wipe dir="d"/>
   </p:transition>
   <p:timing>
     <p:tnLst>
       <p:par>
-        <p:cTn id="1" dur="indefinite" restart="never" nodeType="tmRoot"/>
+        <p:cTn xmlns:p14="http://schemas.microsoft.com/office/powerpoint/2010/main" id="1" dur="indefinite" restart="never" nodeType="tmRoot"/>
       </p:par>
     </p:tnLst>
   </p:timing>
@@ -6743,13 +6767,13 @@
   <p:clrMapOvr>
     <a:masterClrMapping/>
   </p:clrMapOvr>
-  <p:transition spd="slow">
+  <p:transition xmlns:p14="http://schemas.microsoft.com/office/powerpoint/2010/main" spd="slow">
     <p:wipe dir="d"/>
   </p:transition>
   <p:timing>
     <p:tnLst>
       <p:par>
-        <p:cTn id="1" dur="indefinite" restart="never" nodeType="tmRoot"/>
+        <p:cTn xmlns:p14="http://schemas.microsoft.com/office/powerpoint/2010/main" id="1" dur="indefinite" restart="never" nodeType="tmRoot"/>
       </p:par>
     </p:tnLst>
   </p:timing>
@@ -7042,13 +7066,13 @@
   <p:clrMapOvr>
     <a:masterClrMapping/>
   </p:clrMapOvr>
-  <p:transition spd="slow">
+  <p:transition xmlns:p14="http://schemas.microsoft.com/office/powerpoint/2010/main" spd="slow">
     <p:wipe dir="d"/>
   </p:transition>
   <p:timing>
     <p:tnLst>
       <p:par>
-        <p:cTn id="1" dur="indefinite" restart="never" nodeType="tmRoot"/>
+        <p:cTn xmlns:p14="http://schemas.microsoft.com/office/powerpoint/2010/main" id="1" dur="indefinite" restart="never" nodeType="tmRoot"/>
       </p:par>
     </p:tnLst>
   </p:timing>
@@ -7222,13 +7246,13 @@
   <p:clrMapOvr>
     <a:masterClrMapping/>
   </p:clrMapOvr>
-  <p:transition spd="slow">
+  <p:transition xmlns:p14="http://schemas.microsoft.com/office/powerpoint/2010/main" spd="slow">
     <p:wipe dir="d"/>
   </p:transition>
   <p:timing>
     <p:tnLst>
       <p:par>
-        <p:cTn id="1" dur="indefinite" restart="never" nodeType="tmRoot"/>
+        <p:cTn xmlns:p14="http://schemas.microsoft.com/office/powerpoint/2010/main" id="1" dur="indefinite" restart="never" nodeType="tmRoot"/>
       </p:par>
     </p:tnLst>
   </p:timing>
@@ -7318,13 +7342,13 @@
   <p:clrMapOvr>
     <a:masterClrMapping/>
   </p:clrMapOvr>
-  <p:transition spd="slow">
+  <p:transition xmlns:p14="http://schemas.microsoft.com/office/powerpoint/2010/main" spd="slow">
     <p:wipe dir="d"/>
   </p:transition>
   <p:timing>
     <p:tnLst>
       <p:par>
-        <p:cTn id="1" dur="indefinite" restart="never" nodeType="tmRoot"/>
+        <p:cTn xmlns:p14="http://schemas.microsoft.com/office/powerpoint/2010/main" id="1" dur="indefinite" restart="never" nodeType="tmRoot"/>
       </p:par>
     </p:tnLst>
   </p:timing>

</xml_diff>